<commit_message>
bunch of new stuff
</commit_message>
<xml_diff>
--- a/Documents/marginsplot figures 041920.pptx
+++ b/Documents/marginsplot figures 041920.pptx
@@ -8,6 +8,7 @@
     <p:sldId id="257" r:id="rId2"/>
     <p:sldId id="258" r:id="rId3"/>
     <p:sldId id="256" r:id="rId4"/>
+    <p:sldId id="259" r:id="rId5"/>
   </p:sldIdLst>
   <p:sldSz cx="12192000" cy="6858000"/>
   <p:notesSz cx="6858000" cy="9144000"/>
@@ -272,7 +273,7 @@
           <a:p>
             <a:fld id="{563F4E0F-853C-4AE9-8E17-E9DA422DF59B}" type="datetimeFigureOut">
               <a:rPr lang="en-US" smtClean="0"/>
-              <a:t>4/19/2020</a:t>
+              <a:t>5/18/2020</a:t>
             </a:fld>
             <a:endParaRPr lang="en-US"/>
           </a:p>
@@ -470,7 +471,7 @@
           <a:p>
             <a:fld id="{563F4E0F-853C-4AE9-8E17-E9DA422DF59B}" type="datetimeFigureOut">
               <a:rPr lang="en-US" smtClean="0"/>
-              <a:t>4/19/2020</a:t>
+              <a:t>5/18/2020</a:t>
             </a:fld>
             <a:endParaRPr lang="en-US"/>
           </a:p>
@@ -678,7 +679,7 @@
           <a:p>
             <a:fld id="{563F4E0F-853C-4AE9-8E17-E9DA422DF59B}" type="datetimeFigureOut">
               <a:rPr lang="en-US" smtClean="0"/>
-              <a:t>4/19/2020</a:t>
+              <a:t>5/18/2020</a:t>
             </a:fld>
             <a:endParaRPr lang="en-US"/>
           </a:p>
@@ -876,7 +877,7 @@
           <a:p>
             <a:fld id="{563F4E0F-853C-4AE9-8E17-E9DA422DF59B}" type="datetimeFigureOut">
               <a:rPr lang="en-US" smtClean="0"/>
-              <a:t>4/19/2020</a:t>
+              <a:t>5/18/2020</a:t>
             </a:fld>
             <a:endParaRPr lang="en-US"/>
           </a:p>
@@ -1151,7 +1152,7 @@
           <a:p>
             <a:fld id="{563F4E0F-853C-4AE9-8E17-E9DA422DF59B}" type="datetimeFigureOut">
               <a:rPr lang="en-US" smtClean="0"/>
-              <a:t>4/19/2020</a:t>
+              <a:t>5/18/2020</a:t>
             </a:fld>
             <a:endParaRPr lang="en-US"/>
           </a:p>
@@ -1416,7 +1417,7 @@
           <a:p>
             <a:fld id="{563F4E0F-853C-4AE9-8E17-E9DA422DF59B}" type="datetimeFigureOut">
               <a:rPr lang="en-US" smtClean="0"/>
-              <a:t>4/19/2020</a:t>
+              <a:t>5/18/2020</a:t>
             </a:fld>
             <a:endParaRPr lang="en-US"/>
           </a:p>
@@ -1828,7 +1829,7 @@
           <a:p>
             <a:fld id="{563F4E0F-853C-4AE9-8E17-E9DA422DF59B}" type="datetimeFigureOut">
               <a:rPr lang="en-US" smtClean="0"/>
-              <a:t>4/19/2020</a:t>
+              <a:t>5/18/2020</a:t>
             </a:fld>
             <a:endParaRPr lang="en-US"/>
           </a:p>
@@ -1969,7 +1970,7 @@
           <a:p>
             <a:fld id="{563F4E0F-853C-4AE9-8E17-E9DA422DF59B}" type="datetimeFigureOut">
               <a:rPr lang="en-US" smtClean="0"/>
-              <a:t>4/19/2020</a:t>
+              <a:t>5/18/2020</a:t>
             </a:fld>
             <a:endParaRPr lang="en-US"/>
           </a:p>
@@ -2082,7 +2083,7 @@
           <a:p>
             <a:fld id="{563F4E0F-853C-4AE9-8E17-E9DA422DF59B}" type="datetimeFigureOut">
               <a:rPr lang="en-US" smtClean="0"/>
-              <a:t>4/19/2020</a:t>
+              <a:t>5/18/2020</a:t>
             </a:fld>
             <a:endParaRPr lang="en-US"/>
           </a:p>
@@ -2393,7 +2394,7 @@
           <a:p>
             <a:fld id="{563F4E0F-853C-4AE9-8E17-E9DA422DF59B}" type="datetimeFigureOut">
               <a:rPr lang="en-US" smtClean="0"/>
-              <a:t>4/19/2020</a:t>
+              <a:t>5/18/2020</a:t>
             </a:fld>
             <a:endParaRPr lang="en-US"/>
           </a:p>
@@ -2681,7 +2682,7 @@
           <a:p>
             <a:fld id="{563F4E0F-853C-4AE9-8E17-E9DA422DF59B}" type="datetimeFigureOut">
               <a:rPr lang="en-US" smtClean="0"/>
-              <a:t>4/19/2020</a:t>
+              <a:t>5/18/2020</a:t>
             </a:fld>
             <a:endParaRPr lang="en-US"/>
           </a:p>
@@ -2922,7 +2923,7 @@
           <a:p>
             <a:fld id="{563F4E0F-853C-4AE9-8E17-E9DA422DF59B}" type="datetimeFigureOut">
               <a:rPr lang="en-US" smtClean="0"/>
-              <a:t>4/19/2020</a:t>
+              <a:t>5/18/2020</a:t>
             </a:fld>
             <a:endParaRPr lang="en-US"/>
           </a:p>
@@ -4075,6 +4076,329 @@
 </p:sld>
 </file>
 
+<file path=ppt/slides/slide4.xml><?xml version="1.0" encoding="utf-8"?>
+<p:sld xmlns:a="http://schemas.openxmlformats.org/drawingml/2006/main" xmlns:r="http://schemas.openxmlformats.org/officeDocument/2006/relationships" xmlns:p="http://schemas.openxmlformats.org/presentationml/2006/main">
+  <p:cSld>
+    <p:spTree>
+      <p:nvGrpSpPr>
+        <p:cNvPr id="1" name=""/>
+        <p:cNvGrpSpPr/>
+        <p:nvPr/>
+      </p:nvGrpSpPr>
+      <p:grpSpPr>
+        <a:xfrm>
+          <a:off x="0" y="0"/>
+          <a:ext cx="0" cy="0"/>
+          <a:chOff x="0" y="0"/>
+          <a:chExt cx="0" cy="0"/>
+        </a:xfrm>
+      </p:grpSpPr>
+      <p:pic>
+        <p:nvPicPr>
+          <p:cNvPr id="4" name="Picture 3">
+            <a:extLst>
+              <a:ext uri="{FF2B5EF4-FFF2-40B4-BE49-F238E27FC236}">
+                <a16:creationId xmlns:a16="http://schemas.microsoft.com/office/drawing/2014/main" id="{712DE145-22BD-43FF-92B5-ADD40618F817}"/>
+              </a:ext>
+            </a:extLst>
+          </p:cNvPr>
+          <p:cNvPicPr>
+            <a:picLocks noChangeAspect="1"/>
+          </p:cNvPicPr>
+          <p:nvPr/>
+        </p:nvPicPr>
+        <p:blipFill>
+          <a:blip r:embed="rId2"/>
+          <a:stretch>
+            <a:fillRect/>
+          </a:stretch>
+        </p:blipFill>
+        <p:spPr>
+          <a:xfrm>
+            <a:off x="78218" y="1482654"/>
+            <a:ext cx="4017120" cy="2926080"/>
+          </a:xfrm>
+          <a:prstGeom prst="rect">
+            <a:avLst/>
+          </a:prstGeom>
+        </p:spPr>
+      </p:pic>
+      <p:pic>
+        <p:nvPicPr>
+          <p:cNvPr id="7" name="Picture 6">
+            <a:extLst>
+              <a:ext uri="{FF2B5EF4-FFF2-40B4-BE49-F238E27FC236}">
+                <a16:creationId xmlns:a16="http://schemas.microsoft.com/office/drawing/2014/main" id="{F484BF90-C7AD-4587-B33B-66631508A6D5}"/>
+              </a:ext>
+            </a:extLst>
+          </p:cNvPr>
+          <p:cNvPicPr>
+            <a:picLocks noChangeAspect="1"/>
+          </p:cNvPicPr>
+          <p:nvPr/>
+        </p:nvPicPr>
+        <p:blipFill>
+          <a:blip r:embed="rId3"/>
+          <a:stretch>
+            <a:fillRect/>
+          </a:stretch>
+        </p:blipFill>
+        <p:spPr>
+          <a:xfrm>
+            <a:off x="8144686" y="1482654"/>
+            <a:ext cx="4017120" cy="2926080"/>
+          </a:xfrm>
+          <a:prstGeom prst="rect">
+            <a:avLst/>
+          </a:prstGeom>
+        </p:spPr>
+      </p:pic>
+      <p:pic>
+        <p:nvPicPr>
+          <p:cNvPr id="9" name="Picture 8">
+            <a:extLst>
+              <a:ext uri="{FF2B5EF4-FFF2-40B4-BE49-F238E27FC236}">
+                <a16:creationId xmlns:a16="http://schemas.microsoft.com/office/drawing/2014/main" id="{CE735554-31C7-4D6B-AE68-DB18E1FD1776}"/>
+              </a:ext>
+            </a:extLst>
+          </p:cNvPr>
+          <p:cNvPicPr>
+            <a:picLocks noChangeAspect="1"/>
+          </p:cNvPicPr>
+          <p:nvPr/>
+        </p:nvPicPr>
+        <p:blipFill>
+          <a:blip r:embed="rId4"/>
+          <a:stretch>
+            <a:fillRect/>
+          </a:stretch>
+        </p:blipFill>
+        <p:spPr>
+          <a:xfrm>
+            <a:off x="4111452" y="1482654"/>
+            <a:ext cx="4017120" cy="2926080"/>
+          </a:xfrm>
+          <a:prstGeom prst="rect">
+            <a:avLst/>
+          </a:prstGeom>
+        </p:spPr>
+      </p:pic>
+      <p:sp>
+        <p:nvSpPr>
+          <p:cNvPr id="8" name="Rectangle 7">
+            <a:extLst>
+              <a:ext uri="{FF2B5EF4-FFF2-40B4-BE49-F238E27FC236}">
+                <a16:creationId xmlns:a16="http://schemas.microsoft.com/office/drawing/2014/main" id="{6A2D57A4-8A92-487E-B88A-D6A9FD59155F}"/>
+              </a:ext>
+            </a:extLst>
+          </p:cNvPr>
+          <p:cNvSpPr/>
+          <p:nvPr/>
+        </p:nvSpPr>
+        <p:spPr>
+          <a:xfrm>
+            <a:off x="78218" y="4040257"/>
+            <a:ext cx="11767037" cy="246517"/>
+          </a:xfrm>
+          <a:prstGeom prst="rect">
+            <a:avLst/>
+          </a:prstGeom>
+          <a:solidFill>
+            <a:schemeClr val="bg1"/>
+          </a:solidFill>
+          <a:ln>
+            <a:solidFill>
+              <a:schemeClr val="bg1"/>
+            </a:solidFill>
+          </a:ln>
+        </p:spPr>
+        <p:style>
+          <a:lnRef idx="2">
+            <a:schemeClr val="accent1">
+              <a:shade val="50000"/>
+            </a:schemeClr>
+          </a:lnRef>
+          <a:fillRef idx="1">
+            <a:schemeClr val="accent1"/>
+          </a:fillRef>
+          <a:effectRef idx="0">
+            <a:schemeClr val="accent1"/>
+          </a:effectRef>
+          <a:fontRef idx="minor">
+            <a:schemeClr val="lt1"/>
+          </a:fontRef>
+        </p:style>
+        <p:txBody>
+          <a:bodyPr rtlCol="0" anchor="ctr"/>
+          <a:lstStyle/>
+          <a:p>
+            <a:pPr algn="ctr"/>
+            <a:endParaRPr lang="en-US"/>
+          </a:p>
+        </p:txBody>
+      </p:sp>
+      <p:sp>
+        <p:nvSpPr>
+          <p:cNvPr id="10" name="TextBox 9">
+            <a:extLst>
+              <a:ext uri="{FF2B5EF4-FFF2-40B4-BE49-F238E27FC236}">
+                <a16:creationId xmlns:a16="http://schemas.microsoft.com/office/drawing/2014/main" id="{44179888-8C80-4465-B8E1-5E398F966084}"/>
+              </a:ext>
+            </a:extLst>
+          </p:cNvPr>
+          <p:cNvSpPr txBox="1"/>
+          <p:nvPr/>
+        </p:nvSpPr>
+        <p:spPr>
+          <a:xfrm>
+            <a:off x="385894" y="184558"/>
+            <a:ext cx="2952924" cy="369332"/>
+          </a:xfrm>
+          <a:prstGeom prst="rect">
+            <a:avLst/>
+          </a:prstGeom>
+          <a:noFill/>
+        </p:spPr>
+        <p:txBody>
+          <a:bodyPr wrap="square" rtlCol="0">
+            <a:spAutoFit/>
+          </a:bodyPr>
+          <a:lstStyle/>
+          <a:p>
+            <a:r>
+              <a:rPr lang="en-US" dirty="0"/>
+              <a:t>AS OF 051820</a:t>
+            </a:r>
+          </a:p>
+        </p:txBody>
+      </p:sp>
+      <p:sp>
+        <p:nvSpPr>
+          <p:cNvPr id="11" name="TextBox 10">
+            <a:extLst>
+              <a:ext uri="{FF2B5EF4-FFF2-40B4-BE49-F238E27FC236}">
+                <a16:creationId xmlns:a16="http://schemas.microsoft.com/office/drawing/2014/main" id="{3E9BF030-2ED3-49A1-9624-8EF487B981A5}"/>
+              </a:ext>
+            </a:extLst>
+          </p:cNvPr>
+          <p:cNvSpPr txBox="1"/>
+          <p:nvPr/>
+        </p:nvSpPr>
+        <p:spPr>
+          <a:xfrm>
+            <a:off x="78218" y="1108509"/>
+            <a:ext cx="497840" cy="307777"/>
+          </a:xfrm>
+          <a:prstGeom prst="rect">
+            <a:avLst/>
+          </a:prstGeom>
+          <a:noFill/>
+        </p:spPr>
+        <p:txBody>
+          <a:bodyPr wrap="square" rtlCol="0">
+            <a:spAutoFit/>
+          </a:bodyPr>
+          <a:lstStyle/>
+          <a:p>
+            <a:r>
+              <a:rPr lang="en-US" sz="1400" b="1" dirty="0">
+                <a:latin typeface="Arial" panose="020B0604020202020204" pitchFamily="34" charset="0"/>
+                <a:cs typeface="Arial" panose="020B0604020202020204" pitchFamily="34" charset="0"/>
+              </a:rPr>
+              <a:t>a)</a:t>
+            </a:r>
+          </a:p>
+        </p:txBody>
+      </p:sp>
+      <p:sp>
+        <p:nvSpPr>
+          <p:cNvPr id="12" name="TextBox 11">
+            <a:extLst>
+              <a:ext uri="{FF2B5EF4-FFF2-40B4-BE49-F238E27FC236}">
+                <a16:creationId xmlns:a16="http://schemas.microsoft.com/office/drawing/2014/main" id="{FB8117F4-F91A-416B-A0A1-3C82B214EB63}"/>
+              </a:ext>
+            </a:extLst>
+          </p:cNvPr>
+          <p:cNvSpPr txBox="1"/>
+          <p:nvPr/>
+        </p:nvSpPr>
+        <p:spPr>
+          <a:xfrm>
+            <a:off x="4111452" y="1108508"/>
+            <a:ext cx="497840" cy="307777"/>
+          </a:xfrm>
+          <a:prstGeom prst="rect">
+            <a:avLst/>
+          </a:prstGeom>
+          <a:noFill/>
+        </p:spPr>
+        <p:txBody>
+          <a:bodyPr wrap="square" rtlCol="0">
+            <a:spAutoFit/>
+          </a:bodyPr>
+          <a:lstStyle/>
+          <a:p>
+            <a:r>
+              <a:rPr lang="en-US" sz="1400" b="1" dirty="0">
+                <a:latin typeface="Arial" panose="020B0604020202020204" pitchFamily="34" charset="0"/>
+                <a:cs typeface="Arial" panose="020B0604020202020204" pitchFamily="34" charset="0"/>
+              </a:rPr>
+              <a:t>b)</a:t>
+            </a:r>
+          </a:p>
+        </p:txBody>
+      </p:sp>
+      <p:sp>
+        <p:nvSpPr>
+          <p:cNvPr id="13" name="TextBox 12">
+            <a:extLst>
+              <a:ext uri="{FF2B5EF4-FFF2-40B4-BE49-F238E27FC236}">
+                <a16:creationId xmlns:a16="http://schemas.microsoft.com/office/drawing/2014/main" id="{5246CE82-609D-4066-9888-AA89AD347F63}"/>
+              </a:ext>
+            </a:extLst>
+          </p:cNvPr>
+          <p:cNvSpPr txBox="1"/>
+          <p:nvPr/>
+        </p:nvSpPr>
+        <p:spPr>
+          <a:xfrm>
+            <a:off x="8144686" y="1113675"/>
+            <a:ext cx="497840" cy="307777"/>
+          </a:xfrm>
+          <a:prstGeom prst="rect">
+            <a:avLst/>
+          </a:prstGeom>
+          <a:noFill/>
+        </p:spPr>
+        <p:txBody>
+          <a:bodyPr wrap="square" rtlCol="0">
+            <a:spAutoFit/>
+          </a:bodyPr>
+          <a:lstStyle/>
+          <a:p>
+            <a:r>
+              <a:rPr lang="en-US" sz="1400" b="1" dirty="0">
+                <a:latin typeface="Arial" panose="020B0604020202020204" pitchFamily="34" charset="0"/>
+                <a:cs typeface="Arial" panose="020B0604020202020204" pitchFamily="34" charset="0"/>
+              </a:rPr>
+              <a:t>c)</a:t>
+            </a:r>
+          </a:p>
+        </p:txBody>
+      </p:sp>
+    </p:spTree>
+    <p:extLst>
+      <p:ext uri="{BB962C8B-B14F-4D97-AF65-F5344CB8AC3E}">
+        <p14:creationId xmlns:p14="http://schemas.microsoft.com/office/powerpoint/2010/main" val="910980988"/>
+      </p:ext>
+    </p:extLst>
+  </p:cSld>
+  <p:clrMapOvr>
+    <a:masterClrMapping/>
+  </p:clrMapOvr>
+</p:sld>
+</file>
+
 <file path=ppt/theme/theme1.xml><?xml version="1.0" encoding="utf-8"?>
 <a:theme xmlns:a="http://schemas.openxmlformats.org/drawingml/2006/main" name="Office Theme">
   <a:themeElements>

</xml_diff>